<commit_message>
Added the talk for tomorrow, this is a guideline, not the precise words
</commit_message>
<xml_diff>
--- a/Presentation/Zelula.pptx
+++ b/Presentation/Zelula.pptx
@@ -3120,7 +3120,12 @@
             <p:ph type="ctrTitle"/>
           </p:nvPr>
         </p:nvSpPr>
-        <p:spPr/>
+        <p:spPr>
+          <a:xfrm>
+            <a:off x="685800" y="762000"/>
+            <a:ext cx="7772400" cy="1470025"/>
+          </a:xfrm>
+        </p:spPr>
         <p:txBody>
           <a:bodyPr/>
           <a:lstStyle/>
@@ -3151,7 +3156,12 @@
             <p:ph type="subTitle" idx="1"/>
           </p:nvPr>
         </p:nvSpPr>
-        <p:spPr/>
+        <p:spPr>
+          <a:xfrm>
+            <a:off x="1447800" y="4800600"/>
+            <a:ext cx="6400800" cy="1752600"/>
+          </a:xfrm>
+        </p:spPr>
         <p:txBody>
           <a:bodyPr/>
           <a:lstStyle/>
@@ -3323,12 +3333,12 @@
           <a:lstStyle/>
           <a:p>
             <a:r>
-              <a:rPr lang="en-US" dirty="0" err="1" smtClean="0">
+              <a:rPr lang="en-US" dirty="0" smtClean="0">
                 <a:solidFill>
                   <a:schemeClr val="bg1"/>
                 </a:solidFill>
               </a:rPr>
-              <a:t>Inhoud</a:t>
+              <a:t>Contents</a:t>
             </a:r>
             <a:endParaRPr lang="en-US" dirty="0">
               <a:solidFill>
@@ -3362,12 +3372,12 @@
               <a:t>Project </a:t>
             </a:r>
             <a:r>
-              <a:rPr lang="en-US" dirty="0" err="1" smtClean="0">
+              <a:rPr lang="en-US" dirty="0" smtClean="0">
                 <a:solidFill>
                   <a:schemeClr val="bg1"/>
                 </a:solidFill>
               </a:rPr>
-              <a:t>beschrijving</a:t>
+              <a:t>description</a:t>
             </a:r>
             <a:endParaRPr lang="en-US" dirty="0" smtClean="0">
               <a:solidFill>
@@ -3377,60 +3387,12 @@
           </a:p>
           <a:p>
             <a:r>
-              <a:rPr lang="en-US" dirty="0" err="1" smtClean="0">
+              <a:rPr lang="en-US" dirty="0" smtClean="0">
                 <a:solidFill>
                   <a:schemeClr val="bg1"/>
                 </a:solidFill>
               </a:rPr>
-              <a:t>Wat</a:t>
-            </a:r>
-            <a:r>
-              <a:rPr lang="en-US" dirty="0" smtClean="0">
-                <a:solidFill>
-                  <a:schemeClr val="bg1"/>
-                </a:solidFill>
-              </a:rPr>
-              <a:t> </a:t>
-            </a:r>
-            <a:r>
-              <a:rPr lang="en-US" dirty="0" err="1" smtClean="0">
-                <a:solidFill>
-                  <a:schemeClr val="bg1"/>
-                </a:solidFill>
-              </a:rPr>
-              <a:t>wilde</a:t>
-            </a:r>
-            <a:r>
-              <a:rPr lang="en-US" dirty="0" smtClean="0">
-                <a:solidFill>
-                  <a:schemeClr val="bg1"/>
-                </a:solidFill>
-              </a:rPr>
-              <a:t> </a:t>
-            </a:r>
-            <a:r>
-              <a:rPr lang="en-US" dirty="0" err="1" smtClean="0">
-                <a:solidFill>
-                  <a:schemeClr val="bg1"/>
-                </a:solidFill>
-              </a:rPr>
-              <a:t>wij</a:t>
-            </a:r>
-            <a:r>
-              <a:rPr lang="en-US" dirty="0" smtClean="0">
-                <a:solidFill>
-                  <a:schemeClr val="bg1"/>
-                </a:solidFill>
-              </a:rPr>
-              <a:t> </a:t>
-            </a:r>
-            <a:r>
-              <a:rPr lang="en-US" dirty="0" err="1" smtClean="0">
-                <a:solidFill>
-                  <a:schemeClr val="bg1"/>
-                </a:solidFill>
-              </a:rPr>
-              <a:t>bouwen</a:t>
+              <a:t>Plan</a:t>
             </a:r>
             <a:endParaRPr lang="en-US" dirty="0" smtClean="0">
               <a:solidFill>
@@ -3440,44 +3402,12 @@
           </a:p>
           <a:p>
             <a:r>
-              <a:rPr lang="en-US" dirty="0" err="1" smtClean="0">
+              <a:rPr lang="en-US" dirty="0" smtClean="0">
                 <a:solidFill>
                   <a:schemeClr val="bg1"/>
                 </a:solidFill>
               </a:rPr>
-              <a:t>Wat</a:t>
-            </a:r>
-            <a:r>
-              <a:rPr lang="en-US" dirty="0" smtClean="0">
-                <a:solidFill>
-                  <a:schemeClr val="bg1"/>
-                </a:solidFill>
-              </a:rPr>
-              <a:t> </a:t>
-            </a:r>
-            <a:r>
-              <a:rPr lang="en-US" dirty="0" err="1" smtClean="0">
-                <a:solidFill>
-                  <a:schemeClr val="bg1"/>
-                </a:solidFill>
-              </a:rPr>
-              <a:t>hebben</a:t>
-            </a:r>
-            <a:r>
-              <a:rPr lang="en-US" dirty="0" smtClean="0">
-                <a:solidFill>
-                  <a:schemeClr val="bg1"/>
-                </a:solidFill>
-              </a:rPr>
-              <a:t> we </a:t>
-            </a:r>
-            <a:r>
-              <a:rPr lang="en-US" dirty="0" err="1" smtClean="0">
-                <a:solidFill>
-                  <a:schemeClr val="bg1"/>
-                </a:solidFill>
-              </a:rPr>
-              <a:t>gebouwd</a:t>
+              <a:t>Result</a:t>
             </a:r>
             <a:endParaRPr lang="en-US" dirty="0" smtClean="0">
               <a:solidFill>
@@ -3487,28 +3417,12 @@
           </a:p>
           <a:p>
             <a:r>
-              <a:rPr lang="en-US" dirty="0" err="1" smtClean="0">
+              <a:rPr lang="en-US" dirty="0" smtClean="0">
                 <a:solidFill>
                   <a:schemeClr val="bg1"/>
                 </a:solidFill>
               </a:rPr>
-              <a:t>Toekomstige</a:t>
-            </a:r>
-            <a:r>
-              <a:rPr lang="en-US" dirty="0" smtClean="0">
-                <a:solidFill>
-                  <a:schemeClr val="bg1"/>
-                </a:solidFill>
-              </a:rPr>
-              <a:t> </a:t>
-            </a:r>
-            <a:r>
-              <a:rPr lang="en-US" dirty="0" err="1" smtClean="0">
-                <a:solidFill>
-                  <a:schemeClr val="bg1"/>
-                </a:solidFill>
-              </a:rPr>
-              <a:t>uitbreidingen</a:t>
+              <a:t>Future implementation</a:t>
             </a:r>
             <a:endParaRPr lang="en-US" dirty="0" smtClean="0">
               <a:solidFill>
@@ -3589,15 +3503,7 @@
                   <a:schemeClr val="bg1"/>
                 </a:solidFill>
               </a:rPr>
-              <a:t>Project </a:t>
-            </a:r>
-            <a:r>
-              <a:rPr lang="en-US" dirty="0" err="1" smtClean="0">
-                <a:solidFill>
-                  <a:schemeClr val="bg1"/>
-                </a:solidFill>
-              </a:rPr>
-              <a:t>beschrijving</a:t>
+              <a:t>Project description</a:t>
             </a:r>
             <a:endParaRPr lang="en-US" dirty="0">
               <a:solidFill>
@@ -3683,60 +3589,12 @@
           <a:lstStyle/>
           <a:p>
             <a:r>
-              <a:rPr lang="en-US" dirty="0" err="1" smtClean="0">
+              <a:rPr lang="en-US" dirty="0" smtClean="0">
                 <a:solidFill>
                   <a:schemeClr val="bg1"/>
                 </a:solidFill>
               </a:rPr>
-              <a:t>Wat</a:t>
-            </a:r>
-            <a:r>
-              <a:rPr lang="en-US" dirty="0" smtClean="0">
-                <a:solidFill>
-                  <a:schemeClr val="bg1"/>
-                </a:solidFill>
-              </a:rPr>
-              <a:t> </a:t>
-            </a:r>
-            <a:r>
-              <a:rPr lang="en-US" dirty="0" err="1" smtClean="0">
-                <a:solidFill>
-                  <a:schemeClr val="bg1"/>
-                </a:solidFill>
-              </a:rPr>
-              <a:t>wilden</a:t>
-            </a:r>
-            <a:r>
-              <a:rPr lang="en-US" dirty="0" smtClean="0">
-                <a:solidFill>
-                  <a:schemeClr val="bg1"/>
-                </a:solidFill>
-              </a:rPr>
-              <a:t> </a:t>
-            </a:r>
-            <a:r>
-              <a:rPr lang="en-US" dirty="0" err="1" smtClean="0">
-                <a:solidFill>
-                  <a:schemeClr val="bg1"/>
-                </a:solidFill>
-              </a:rPr>
-              <a:t>wij</a:t>
-            </a:r>
-            <a:r>
-              <a:rPr lang="en-US" dirty="0" smtClean="0">
-                <a:solidFill>
-                  <a:schemeClr val="bg1"/>
-                </a:solidFill>
-              </a:rPr>
-              <a:t> </a:t>
-            </a:r>
-            <a:r>
-              <a:rPr lang="en-US" dirty="0" err="1" smtClean="0">
-                <a:solidFill>
-                  <a:schemeClr val="bg1"/>
-                </a:solidFill>
-              </a:rPr>
-              <a:t>bouwen</a:t>
+              <a:t>Plan</a:t>
             </a:r>
             <a:endParaRPr lang="en-US" dirty="0">
               <a:solidFill>
@@ -3828,44 +3686,12 @@
           <a:lstStyle/>
           <a:p>
             <a:r>
-              <a:rPr lang="en-US" dirty="0" err="1" smtClean="0">
+              <a:rPr lang="en-US" dirty="0" smtClean="0">
                 <a:solidFill>
                   <a:schemeClr val="bg1"/>
                 </a:solidFill>
               </a:rPr>
-              <a:t>Wat</a:t>
-            </a:r>
-            <a:r>
-              <a:rPr lang="en-US" dirty="0" smtClean="0">
-                <a:solidFill>
-                  <a:schemeClr val="bg1"/>
-                </a:solidFill>
-              </a:rPr>
-              <a:t> </a:t>
-            </a:r>
-            <a:r>
-              <a:rPr lang="en-US" dirty="0" err="1" smtClean="0">
-                <a:solidFill>
-                  <a:schemeClr val="bg1"/>
-                </a:solidFill>
-              </a:rPr>
-              <a:t>hebben</a:t>
-            </a:r>
-            <a:r>
-              <a:rPr lang="en-US" dirty="0" smtClean="0">
-                <a:solidFill>
-                  <a:schemeClr val="bg1"/>
-                </a:solidFill>
-              </a:rPr>
-              <a:t> we </a:t>
-            </a:r>
-            <a:r>
-              <a:rPr lang="en-US" dirty="0" err="1" smtClean="0">
-                <a:solidFill>
-                  <a:schemeClr val="bg1"/>
-                </a:solidFill>
-              </a:rPr>
-              <a:t>gebouwd</a:t>
+              <a:t>Result</a:t>
             </a:r>
             <a:endParaRPr lang="en-US" dirty="0">
               <a:solidFill>
@@ -3957,28 +3783,12 @@
           <a:lstStyle/>
           <a:p>
             <a:r>
-              <a:rPr lang="en-US" dirty="0" err="1" smtClean="0">
+              <a:rPr lang="en-US" dirty="0" smtClean="0">
                 <a:solidFill>
                   <a:schemeClr val="bg1"/>
                 </a:solidFill>
               </a:rPr>
-              <a:t>Toekomstige</a:t>
-            </a:r>
-            <a:r>
-              <a:rPr lang="en-US" dirty="0" smtClean="0">
-                <a:solidFill>
-                  <a:schemeClr val="bg1"/>
-                </a:solidFill>
-              </a:rPr>
-              <a:t> </a:t>
-            </a:r>
-            <a:r>
-              <a:rPr lang="en-US" dirty="0" err="1" smtClean="0">
-                <a:solidFill>
-                  <a:schemeClr val="bg1"/>
-                </a:solidFill>
-              </a:rPr>
-              <a:t>uitbreidingen</a:t>
+              <a:t>Future implementation</a:t>
             </a:r>
             <a:endParaRPr lang="en-US" dirty="0">
               <a:solidFill>

</xml_diff>

<commit_message>
final presentation. Text is outdated but you will notice tomorrow. See you guys at 11 Drebbelweg
</commit_message>
<xml_diff>
--- a/Presentation/Zelula.pptx
+++ b/Presentation/Zelula.pptx
@@ -3096,6 +3096,20 @@
 <file path=ppt/slides/slide1.xml><?xml version="1.0" encoding="utf-8"?>
 <p:sld xmlns:a="http://schemas.openxmlformats.org/drawingml/2006/main" xmlns:r="http://schemas.openxmlformats.org/officeDocument/2006/relationships" xmlns:p="http://schemas.openxmlformats.org/presentationml/2006/main">
   <p:cSld>
+    <p:bg>
+      <p:bgPr>
+        <a:blipFill dpi="0" rotWithShape="1">
+          <a:blip r:embed="rId2">
+            <a:lum/>
+          </a:blip>
+          <a:srcRect/>
+          <a:stretch>
+            <a:fillRect l="-10000" r="-10000"/>
+          </a:stretch>
+        </a:blipFill>
+        <a:effectLst/>
+      </p:bgPr>
+    </p:bg>
     <p:spTree>
       <p:nvGrpSpPr>
         <p:cNvPr id="1" name=""/>
@@ -3369,21 +3383,8 @@
                   <a:schemeClr val="bg1"/>
                 </a:solidFill>
               </a:rPr>
-              <a:t>Project </a:t>
-            </a:r>
-            <a:r>
-              <a:rPr lang="en-US" dirty="0" smtClean="0">
-                <a:solidFill>
-                  <a:schemeClr val="bg1"/>
-                </a:solidFill>
-              </a:rPr>
-              <a:t>description</a:t>
-            </a:r>
-            <a:endParaRPr lang="en-US" dirty="0" smtClean="0">
-              <a:solidFill>
-                <a:schemeClr val="bg1"/>
-              </a:solidFill>
-            </a:endParaRPr>
+              <a:t>Project description</a:t>
+            </a:r>
           </a:p>
           <a:p>
             <a:r>
@@ -3394,11 +3395,6 @@
               </a:rPr>
               <a:t>Plan</a:t>
             </a:r>
-            <a:endParaRPr lang="en-US" dirty="0" smtClean="0">
-              <a:solidFill>
-                <a:schemeClr val="bg1"/>
-              </a:solidFill>
-            </a:endParaRPr>
           </a:p>
           <a:p>
             <a:r>
@@ -3409,11 +3405,6 @@
               </a:rPr>
               <a:t>Result</a:t>
             </a:r>
-            <a:endParaRPr lang="en-US" dirty="0" smtClean="0">
-              <a:solidFill>
-                <a:schemeClr val="bg1"/>
-              </a:solidFill>
-            </a:endParaRPr>
           </a:p>
           <a:p>
             <a:r>
@@ -3424,11 +3415,6 @@
               </a:rPr>
               <a:t>Future implementation</a:t>
             </a:r>
-            <a:endParaRPr lang="en-US" dirty="0" smtClean="0">
-              <a:solidFill>
-                <a:schemeClr val="bg1"/>
-              </a:solidFill>
-            </a:endParaRPr>
           </a:p>
           <a:p>
             <a:r>
@@ -3513,29 +3499,88 @@
           </a:p>
         </p:txBody>
       </p:sp>
-      <p:sp>
-        <p:nvSpPr>
-          <p:cNvPr id="3" name="Content Placeholder 2"/>
-          <p:cNvSpPr>
-            <a:spLocks noGrp="1"/>
-          </p:cNvSpPr>
-          <p:nvPr>
-            <p:ph idx="1"/>
-          </p:nvPr>
-        </p:nvSpPr>
-        <p:spPr/>
-        <p:txBody>
-          <a:bodyPr/>
-          <a:lstStyle/>
-          <a:p>
-            <a:endParaRPr lang="en-US" dirty="0">
-              <a:solidFill>
-                <a:schemeClr val="bg1"/>
-              </a:solidFill>
-            </a:endParaRPr>
-          </a:p>
-        </p:txBody>
-      </p:sp>
+      <p:pic>
+        <p:nvPicPr>
+          <p:cNvPr id="1029" name="Picture 5" descr="C:\Users\Thomas van Helden\Downloads\14Entity_in_membrane_render.png"/>
+          <p:cNvPicPr>
+            <a:picLocks noChangeAspect="1" noChangeArrowheads="1"/>
+          </p:cNvPicPr>
+          <p:nvPr/>
+        </p:nvPicPr>
+        <p:blipFill>
+          <a:blip r:embed="rId2" cstate="print">
+            <a:extLst>
+              <a:ext uri="{28A0092B-C50C-407E-A947-70E740481C1C}">
+                <a14:useLocalDpi xmlns:a14="http://schemas.microsoft.com/office/drawing/2010/main" val="0"/>
+              </a:ext>
+            </a:extLst>
+          </a:blip>
+          <a:srcRect/>
+          <a:stretch>
+            <a:fillRect/>
+          </a:stretch>
+        </p:blipFill>
+        <p:spPr bwMode="auto">
+          <a:xfrm>
+            <a:off x="228600" y="914400"/>
+            <a:ext cx="2799184" cy="3048000"/>
+          </a:xfrm>
+          <a:prstGeom prst="rect">
+            <a:avLst/>
+          </a:prstGeom>
+          <a:noFill/>
+          <a:extLst>
+            <a:ext uri="{909E8E84-426E-40DD-AFC4-6F175D3DCCD1}">
+              <a14:hiddenFill xmlns:a14="http://schemas.microsoft.com/office/drawing/2010/main">
+                <a:solidFill>
+                  <a:srgbClr val="FFFFFF"/>
+                </a:solidFill>
+              </a14:hiddenFill>
+            </a:ext>
+          </a:extLst>
+        </p:spPr>
+      </p:pic>
+      <p:pic>
+        <p:nvPicPr>
+          <p:cNvPr id="1031" name="Picture 7" descr="C:\Users\Thomas van Helden\Downloads\pentiumee_processor_back.png"/>
+          <p:cNvPicPr>
+            <a:picLocks noChangeAspect="1" noChangeArrowheads="1"/>
+          </p:cNvPicPr>
+          <p:nvPr/>
+        </p:nvPicPr>
+        <p:blipFill>
+          <a:blip r:embed="rId3" cstate="print">
+            <a:extLst>
+              <a:ext uri="{28A0092B-C50C-407E-A947-70E740481C1C}">
+                <a14:useLocalDpi xmlns:a14="http://schemas.microsoft.com/office/drawing/2010/main" val="0"/>
+              </a:ext>
+            </a:extLst>
+          </a:blip>
+          <a:srcRect/>
+          <a:stretch>
+            <a:fillRect/>
+          </a:stretch>
+        </p:blipFill>
+        <p:spPr bwMode="auto">
+          <a:xfrm>
+            <a:off x="5410200" y="3962400"/>
+            <a:ext cx="3048000" cy="2688337"/>
+          </a:xfrm>
+          <a:prstGeom prst="rect">
+            <a:avLst/>
+          </a:prstGeom>
+          <a:noFill/>
+          <a:extLst>
+            <a:ext uri="{909E8E84-426E-40DD-AFC4-6F175D3DCCD1}">
+              <a14:hiddenFill xmlns:a14="http://schemas.microsoft.com/office/drawing/2010/main">
+                <a:solidFill>
+                  <a:srgbClr val="FFFFFF"/>
+                </a:solidFill>
+              </a14:hiddenFill>
+            </a:ext>
+          </a:extLst>
+        </p:spPr>
+      </p:pic>
     </p:spTree>
     <p:extLst>
       <p:ext uri="{BB962C8B-B14F-4D97-AF65-F5344CB8AC3E}">
@@ -3808,12 +3853,86 @@
             <p:ph idx="1"/>
           </p:nvPr>
         </p:nvSpPr>
-        <p:spPr/>
-        <p:txBody>
-          <a:bodyPr/>
-          <a:lstStyle/>
-          <a:p>
-            <a:endParaRPr lang="en-US"/>
+        <p:spPr>
+          <a:xfrm>
+            <a:off x="457200" y="1676400"/>
+            <a:ext cx="8229600" cy="4525963"/>
+          </a:xfrm>
+        </p:spPr>
+        <p:txBody>
+          <a:bodyPr/>
+          <a:lstStyle/>
+          <a:p>
+            <a:r>
+              <a:rPr lang="en-US" dirty="0" smtClean="0">
+                <a:solidFill>
+                  <a:schemeClr val="bg1"/>
+                </a:solidFill>
+              </a:rPr>
+              <a:t>Displaying compound gates different</a:t>
+            </a:r>
+          </a:p>
+          <a:p>
+            <a:endParaRPr lang="en-US" dirty="0" smtClean="0">
+              <a:solidFill>
+                <a:schemeClr val="bg1"/>
+              </a:solidFill>
+            </a:endParaRPr>
+          </a:p>
+          <a:p>
+            <a:r>
+              <a:rPr lang="en-US" dirty="0" smtClean="0">
+                <a:solidFill>
+                  <a:schemeClr val="bg1"/>
+                </a:solidFill>
+              </a:rPr>
+              <a:t>Advanced zooming</a:t>
+            </a:r>
+          </a:p>
+          <a:p>
+            <a:endParaRPr lang="en-US" dirty="0" smtClean="0">
+              <a:solidFill>
+                <a:schemeClr val="bg1"/>
+              </a:solidFill>
+            </a:endParaRPr>
+          </a:p>
+          <a:p>
+            <a:r>
+              <a:rPr lang="en-US" dirty="0" smtClean="0">
+                <a:solidFill>
+                  <a:schemeClr val="bg1"/>
+                </a:solidFill>
+              </a:rPr>
+              <a:t>Simulation </a:t>
+            </a:r>
+            <a:r>
+              <a:rPr lang="en-US" dirty="0">
+                <a:solidFill>
+                  <a:schemeClr val="bg1"/>
+                </a:solidFill>
+              </a:rPr>
+              <a:t>results in separate </a:t>
+            </a:r>
+            <a:r>
+              <a:rPr lang="en-US" dirty="0" smtClean="0">
+                <a:solidFill>
+                  <a:schemeClr val="bg1"/>
+                </a:solidFill>
+              </a:rPr>
+              <a:t>screen</a:t>
+            </a:r>
+            <a:endParaRPr lang="en-US" dirty="0">
+              <a:solidFill>
+                <a:schemeClr val="bg1"/>
+              </a:solidFill>
+            </a:endParaRPr>
+          </a:p>
+          <a:p>
+            <a:endParaRPr lang="en-US" dirty="0">
+              <a:solidFill>
+                <a:schemeClr val="bg1"/>
+              </a:solidFill>
+            </a:endParaRPr>
           </a:p>
         </p:txBody>
       </p:sp>
@@ -3882,25 +4001,6 @@
                 <a:schemeClr val="bg1"/>
               </a:solidFill>
             </a:endParaRPr>
-          </a:p>
-        </p:txBody>
-      </p:sp>
-      <p:sp>
-        <p:nvSpPr>
-          <p:cNvPr id="3" name="Content Placeholder 2"/>
-          <p:cNvSpPr>
-            <a:spLocks noGrp="1"/>
-          </p:cNvSpPr>
-          <p:nvPr>
-            <p:ph idx="1"/>
-          </p:nvPr>
-        </p:nvSpPr>
-        <p:spPr/>
-        <p:txBody>
-          <a:bodyPr/>
-          <a:lstStyle/>
-          <a:p>
-            <a:endParaRPr lang="en-US"/>
           </a:p>
         </p:txBody>
       </p:sp>

</xml_diff>

<commit_message>
some slides for questions
</commit_message>
<xml_diff>
--- a/Presentation/Zelula.pptx
+++ b/Presentation/Zelula.pptx
@@ -12,6 +12,11 @@
     <p:sldId id="260" r:id="rId6"/>
     <p:sldId id="261" r:id="rId7"/>
     <p:sldId id="262" r:id="rId8"/>
+    <p:sldId id="263" r:id="rId9"/>
+    <p:sldId id="264" r:id="rId10"/>
+    <p:sldId id="265" r:id="rId11"/>
+    <p:sldId id="266" r:id="rId12"/>
+    <p:sldId id="267" r:id="rId13"/>
   </p:sldIdLst>
   <p:sldSz cx="9144000" cy="6858000" type="screen4x3"/>
   <p:notesSz cx="6858000" cy="9144000"/>
@@ -294,7 +299,7 @@
           <a:p>
             <a:fld id="{0C47BD87-53EC-4C8C-BD55-C9A23E03CE8F}" type="datetimeFigureOut">
               <a:rPr lang="en-US" smtClean="0"/>
-              <a:t>19-6-2012</a:t>
+              <a:t>20-6-2012</a:t>
             </a:fld>
             <a:endParaRPr lang="en-US"/>
           </a:p>
@@ -464,7 +469,7 @@
           <a:p>
             <a:fld id="{0C47BD87-53EC-4C8C-BD55-C9A23E03CE8F}" type="datetimeFigureOut">
               <a:rPr lang="en-US" smtClean="0"/>
-              <a:t>19-6-2012</a:t>
+              <a:t>20-6-2012</a:t>
             </a:fld>
             <a:endParaRPr lang="en-US"/>
           </a:p>
@@ -644,7 +649,7 @@
           <a:p>
             <a:fld id="{0C47BD87-53EC-4C8C-BD55-C9A23E03CE8F}" type="datetimeFigureOut">
               <a:rPr lang="en-US" smtClean="0"/>
-              <a:t>19-6-2012</a:t>
+              <a:t>20-6-2012</a:t>
             </a:fld>
             <a:endParaRPr lang="en-US"/>
           </a:p>
@@ -814,7 +819,7 @@
           <a:p>
             <a:fld id="{0C47BD87-53EC-4C8C-BD55-C9A23E03CE8F}" type="datetimeFigureOut">
               <a:rPr lang="en-US" smtClean="0"/>
-              <a:t>19-6-2012</a:t>
+              <a:t>20-6-2012</a:t>
             </a:fld>
             <a:endParaRPr lang="en-US"/>
           </a:p>
@@ -1060,7 +1065,7 @@
           <a:p>
             <a:fld id="{0C47BD87-53EC-4C8C-BD55-C9A23E03CE8F}" type="datetimeFigureOut">
               <a:rPr lang="en-US" smtClean="0"/>
-              <a:t>19-6-2012</a:t>
+              <a:t>20-6-2012</a:t>
             </a:fld>
             <a:endParaRPr lang="en-US"/>
           </a:p>
@@ -1348,7 +1353,7 @@
           <a:p>
             <a:fld id="{0C47BD87-53EC-4C8C-BD55-C9A23E03CE8F}" type="datetimeFigureOut">
               <a:rPr lang="en-US" smtClean="0"/>
-              <a:t>19-6-2012</a:t>
+              <a:t>20-6-2012</a:t>
             </a:fld>
             <a:endParaRPr lang="en-US"/>
           </a:p>
@@ -1770,7 +1775,7 @@
           <a:p>
             <a:fld id="{0C47BD87-53EC-4C8C-BD55-C9A23E03CE8F}" type="datetimeFigureOut">
               <a:rPr lang="en-US" smtClean="0"/>
-              <a:t>19-6-2012</a:t>
+              <a:t>20-6-2012</a:t>
             </a:fld>
             <a:endParaRPr lang="en-US"/>
           </a:p>
@@ -1888,7 +1893,7 @@
           <a:p>
             <a:fld id="{0C47BD87-53EC-4C8C-BD55-C9A23E03CE8F}" type="datetimeFigureOut">
               <a:rPr lang="en-US" smtClean="0"/>
-              <a:t>19-6-2012</a:t>
+              <a:t>20-6-2012</a:t>
             </a:fld>
             <a:endParaRPr lang="en-US"/>
           </a:p>
@@ -1983,7 +1988,7 @@
           <a:p>
             <a:fld id="{0C47BD87-53EC-4C8C-BD55-C9A23E03CE8F}" type="datetimeFigureOut">
               <a:rPr lang="en-US" smtClean="0"/>
-              <a:t>19-6-2012</a:t>
+              <a:t>20-6-2012</a:t>
             </a:fld>
             <a:endParaRPr lang="en-US"/>
           </a:p>
@@ -2260,7 +2265,7 @@
           <a:p>
             <a:fld id="{0C47BD87-53EC-4C8C-BD55-C9A23E03CE8F}" type="datetimeFigureOut">
               <a:rPr lang="en-US" smtClean="0"/>
-              <a:t>19-6-2012</a:t>
+              <a:t>20-6-2012</a:t>
             </a:fld>
             <a:endParaRPr lang="en-US"/>
           </a:p>
@@ -2513,7 +2518,7 @@
           <a:p>
             <a:fld id="{0C47BD87-53EC-4C8C-BD55-C9A23E03CE8F}" type="datetimeFigureOut">
               <a:rPr lang="en-US" smtClean="0"/>
-              <a:t>19-6-2012</a:t>
+              <a:t>20-6-2012</a:t>
             </a:fld>
             <a:endParaRPr lang="en-US"/>
           </a:p>
@@ -2735,7 +2740,7 @@
           <a:p>
             <a:fld id="{0C47BD87-53EC-4C8C-BD55-C9A23E03CE8F}" type="datetimeFigureOut">
               <a:rPr lang="en-US" smtClean="0"/>
-              <a:t>19-6-2012</a:t>
+              <a:t>20-6-2012</a:t>
             </a:fld>
             <a:endParaRPr lang="en-US"/>
           </a:p>
@@ -3314,6 +3319,445 @@
 </p:sld>
 </file>
 
+<file path=ppt/slides/slide10.xml><?xml version="1.0" encoding="utf-8"?>
+<p:sld xmlns:a="http://schemas.openxmlformats.org/drawingml/2006/main" xmlns:r="http://schemas.openxmlformats.org/officeDocument/2006/relationships" xmlns:p="http://schemas.openxmlformats.org/presentationml/2006/main">
+  <p:cSld>
+    <p:spTree>
+      <p:nvGrpSpPr>
+        <p:cNvPr id="1" name=""/>
+        <p:cNvGrpSpPr/>
+        <p:nvPr/>
+      </p:nvGrpSpPr>
+      <p:grpSpPr>
+        <a:xfrm>
+          <a:off x="0" y="0"/>
+          <a:ext cx="0" cy="0"/>
+          <a:chOff x="0" y="0"/>
+          <a:chExt cx="0" cy="0"/>
+        </a:xfrm>
+      </p:grpSpPr>
+      <p:sp>
+        <p:nvSpPr>
+          <p:cNvPr id="2" name="Title 1"/>
+          <p:cNvSpPr>
+            <a:spLocks noGrp="1"/>
+          </p:cNvSpPr>
+          <p:nvPr>
+            <p:ph type="title"/>
+          </p:nvPr>
+        </p:nvSpPr>
+        <p:spPr/>
+        <p:txBody>
+          <a:bodyPr/>
+          <a:lstStyle/>
+          <a:p>
+            <a:r>
+              <a:rPr lang="en-US" dirty="0" smtClean="0">
+                <a:solidFill>
+                  <a:schemeClr val="bg1"/>
+                </a:solidFill>
+              </a:rPr>
+              <a:t>Test coverage Java packages</a:t>
+            </a:r>
+            <a:endParaRPr lang="en-US" dirty="0">
+              <a:solidFill>
+                <a:schemeClr val="bg1"/>
+              </a:solidFill>
+            </a:endParaRPr>
+          </a:p>
+        </p:txBody>
+      </p:sp>
+      <p:pic>
+        <p:nvPicPr>
+          <p:cNvPr id="4" name="Content Placeholder 3"/>
+          <p:cNvPicPr>
+            <a:picLocks noGrp="1" noChangeAspect="1"/>
+          </p:cNvPicPr>
+          <p:nvPr>
+            <p:ph idx="1"/>
+          </p:nvPr>
+        </p:nvPicPr>
+        <p:blipFill>
+          <a:blip r:embed="rId2">
+            <a:extLst>
+              <a:ext uri="{28A0092B-C50C-407E-A947-70E740481C1C}">
+                <a14:useLocalDpi xmlns:a14="http://schemas.microsoft.com/office/drawing/2010/main" val="0"/>
+              </a:ext>
+            </a:extLst>
+          </a:blip>
+          <a:stretch>
+            <a:fillRect/>
+          </a:stretch>
+        </p:blipFill>
+        <p:spPr>
+          <a:xfrm>
+            <a:off x="457200" y="2796828"/>
+            <a:ext cx="8229600" cy="2132707"/>
+          </a:xfrm>
+        </p:spPr>
+      </p:pic>
+    </p:spTree>
+    <p:extLst>
+      <p:ext uri="{BB962C8B-B14F-4D97-AF65-F5344CB8AC3E}">
+        <p14:creationId xmlns:p14="http://schemas.microsoft.com/office/powerpoint/2010/main" val="2020631500"/>
+      </p:ext>
+    </p:extLst>
+  </p:cSld>
+  <p:clrMapOvr>
+    <a:masterClrMapping/>
+  </p:clrMapOvr>
+</p:sld>
+</file>
+
+<file path=ppt/slides/slide11.xml><?xml version="1.0" encoding="utf-8"?>
+<p:sld xmlns:a="http://schemas.openxmlformats.org/drawingml/2006/main" xmlns:r="http://schemas.openxmlformats.org/officeDocument/2006/relationships" xmlns:p="http://schemas.openxmlformats.org/presentationml/2006/main">
+  <p:cSld>
+    <p:spTree>
+      <p:nvGrpSpPr>
+        <p:cNvPr id="1" name=""/>
+        <p:cNvGrpSpPr/>
+        <p:nvPr/>
+      </p:nvGrpSpPr>
+      <p:grpSpPr>
+        <a:xfrm>
+          <a:off x="0" y="0"/>
+          <a:ext cx="0" cy="0"/>
+          <a:chOff x="0" y="0"/>
+          <a:chExt cx="0" cy="0"/>
+        </a:xfrm>
+      </p:grpSpPr>
+      <p:sp>
+        <p:nvSpPr>
+          <p:cNvPr id="2" name="Title 1"/>
+          <p:cNvSpPr>
+            <a:spLocks noGrp="1"/>
+          </p:cNvSpPr>
+          <p:nvPr>
+            <p:ph type="title"/>
+          </p:nvPr>
+        </p:nvSpPr>
+        <p:spPr/>
+        <p:txBody>
+          <a:bodyPr/>
+          <a:lstStyle/>
+          <a:p>
+            <a:r>
+              <a:rPr lang="en-US" dirty="0" smtClean="0">
+                <a:solidFill>
+                  <a:schemeClr val="bg1"/>
+                </a:solidFill>
+              </a:rPr>
+              <a:t>Future implementation part 2</a:t>
+            </a:r>
+            <a:endParaRPr lang="en-US" dirty="0">
+              <a:solidFill>
+                <a:schemeClr val="bg1"/>
+              </a:solidFill>
+            </a:endParaRPr>
+          </a:p>
+        </p:txBody>
+      </p:sp>
+      <p:sp>
+        <p:nvSpPr>
+          <p:cNvPr id="3" name="Content Placeholder 2"/>
+          <p:cNvSpPr>
+            <a:spLocks noGrp="1"/>
+          </p:cNvSpPr>
+          <p:nvPr>
+            <p:ph idx="1"/>
+          </p:nvPr>
+        </p:nvSpPr>
+        <p:spPr/>
+        <p:txBody>
+          <a:bodyPr/>
+          <a:lstStyle/>
+          <a:p>
+            <a:r>
+              <a:rPr lang="en-US" dirty="0" smtClean="0">
+                <a:solidFill>
+                  <a:schemeClr val="bg1"/>
+                </a:solidFill>
+              </a:rPr>
+              <a:t>Acceptance test results</a:t>
+            </a:r>
+          </a:p>
+          <a:p>
+            <a:r>
+              <a:rPr lang="en-US" dirty="0" smtClean="0">
+                <a:solidFill>
+                  <a:schemeClr val="bg1"/>
+                </a:solidFill>
+              </a:rPr>
+              <a:t>Groupings</a:t>
+            </a:r>
+          </a:p>
+          <a:p>
+            <a:r>
+              <a:rPr lang="en-US" dirty="0" smtClean="0">
+                <a:solidFill>
+                  <a:schemeClr val="bg1"/>
+                </a:solidFill>
+              </a:rPr>
+              <a:t>Green dot</a:t>
+            </a:r>
+          </a:p>
+          <a:p>
+            <a:r>
+              <a:rPr lang="en-US" dirty="0" smtClean="0">
+                <a:solidFill>
+                  <a:schemeClr val="bg1"/>
+                </a:solidFill>
+              </a:rPr>
+              <a:t>Display open wires</a:t>
+            </a:r>
+          </a:p>
+          <a:p>
+            <a:r>
+              <a:rPr lang="en-US" dirty="0" smtClean="0">
+                <a:solidFill>
+                  <a:schemeClr val="bg1"/>
+                </a:solidFill>
+              </a:rPr>
+              <a:t>Highlighting problems</a:t>
+            </a:r>
+          </a:p>
+          <a:p>
+            <a:r>
+              <a:rPr lang="en-US" dirty="0" smtClean="0">
+                <a:solidFill>
+                  <a:schemeClr val="bg1"/>
+                </a:solidFill>
+              </a:rPr>
+              <a:t>Compound normal gate distinction</a:t>
+            </a:r>
+            <a:endParaRPr lang="en-US" dirty="0">
+              <a:solidFill>
+                <a:schemeClr val="bg1"/>
+              </a:solidFill>
+            </a:endParaRPr>
+          </a:p>
+        </p:txBody>
+      </p:sp>
+    </p:spTree>
+    <p:extLst>
+      <p:ext uri="{BB962C8B-B14F-4D97-AF65-F5344CB8AC3E}">
+        <p14:creationId xmlns:p14="http://schemas.microsoft.com/office/powerpoint/2010/main" val="1991650938"/>
+      </p:ext>
+    </p:extLst>
+  </p:cSld>
+  <p:clrMapOvr>
+    <a:masterClrMapping/>
+  </p:clrMapOvr>
+</p:sld>
+</file>
+
+<file path=ppt/slides/slide12.xml><?xml version="1.0" encoding="utf-8"?>
+<p:sld xmlns:a="http://schemas.openxmlformats.org/drawingml/2006/main" xmlns:r="http://schemas.openxmlformats.org/officeDocument/2006/relationships" xmlns:p="http://schemas.openxmlformats.org/presentationml/2006/main">
+  <p:cSld>
+    <p:spTree>
+      <p:nvGrpSpPr>
+        <p:cNvPr id="1" name=""/>
+        <p:cNvGrpSpPr/>
+        <p:nvPr/>
+      </p:nvGrpSpPr>
+      <p:grpSpPr>
+        <a:xfrm>
+          <a:off x="0" y="0"/>
+          <a:ext cx="0" cy="0"/>
+          <a:chOff x="0" y="0"/>
+          <a:chExt cx="0" cy="0"/>
+        </a:xfrm>
+      </p:grpSpPr>
+      <p:sp>
+        <p:nvSpPr>
+          <p:cNvPr id="2" name="Title 1"/>
+          <p:cNvSpPr>
+            <a:spLocks noGrp="1"/>
+          </p:cNvSpPr>
+          <p:nvPr>
+            <p:ph type="title"/>
+          </p:nvPr>
+        </p:nvSpPr>
+        <p:spPr/>
+        <p:txBody>
+          <a:bodyPr/>
+          <a:lstStyle/>
+          <a:p>
+            <a:r>
+              <a:rPr lang="en-US" dirty="0" smtClean="0">
+                <a:solidFill>
+                  <a:schemeClr val="bg1"/>
+                </a:solidFill>
+              </a:rPr>
+              <a:t>Libraries </a:t>
+            </a:r>
+            <a:r>
+              <a:rPr lang="en-US" dirty="0" err="1" smtClean="0">
+                <a:solidFill>
+                  <a:schemeClr val="bg1"/>
+                </a:solidFill>
+              </a:rPr>
+              <a:t>etc</a:t>
+            </a:r>
+            <a:endParaRPr lang="en-US" dirty="0">
+              <a:solidFill>
+                <a:schemeClr val="bg1"/>
+              </a:solidFill>
+            </a:endParaRPr>
+          </a:p>
+        </p:txBody>
+      </p:sp>
+      <p:sp>
+        <p:nvSpPr>
+          <p:cNvPr id="3" name="Content Placeholder 2"/>
+          <p:cNvSpPr>
+            <a:spLocks noGrp="1"/>
+          </p:cNvSpPr>
+          <p:nvPr>
+            <p:ph idx="1"/>
+          </p:nvPr>
+        </p:nvSpPr>
+        <p:spPr/>
+        <p:txBody>
+          <a:bodyPr>
+            <a:normAutofit fontScale="92500" lnSpcReduction="20000"/>
+          </a:bodyPr>
+          <a:lstStyle/>
+          <a:p>
+            <a:r>
+              <a:rPr lang="en-US" dirty="0" err="1" smtClean="0">
+                <a:solidFill>
+                  <a:schemeClr val="bg1"/>
+                </a:solidFill>
+              </a:rPr>
+              <a:t>jsPlumb</a:t>
+            </a:r>
+            <a:endParaRPr lang="en-US" dirty="0" smtClean="0">
+              <a:solidFill>
+                <a:schemeClr val="bg1"/>
+              </a:solidFill>
+            </a:endParaRPr>
+          </a:p>
+          <a:p>
+            <a:r>
+              <a:rPr lang="en-US" dirty="0" smtClean="0">
+                <a:solidFill>
+                  <a:schemeClr val="bg1"/>
+                </a:solidFill>
+              </a:rPr>
+              <a:t>Less</a:t>
+            </a:r>
+          </a:p>
+          <a:p>
+            <a:r>
+              <a:rPr lang="en-US" dirty="0" smtClean="0">
+                <a:solidFill>
+                  <a:schemeClr val="bg1"/>
+                </a:solidFill>
+              </a:rPr>
+              <a:t>Ant</a:t>
+            </a:r>
+          </a:p>
+          <a:p>
+            <a:r>
+              <a:rPr lang="en-US" dirty="0" err="1" smtClean="0">
+                <a:solidFill>
+                  <a:schemeClr val="bg1"/>
+                </a:solidFill>
+              </a:rPr>
+              <a:t>HighChart</a:t>
+            </a:r>
+            <a:endParaRPr lang="en-US" dirty="0" smtClean="0">
+              <a:solidFill>
+                <a:schemeClr val="bg1"/>
+              </a:solidFill>
+            </a:endParaRPr>
+          </a:p>
+          <a:p>
+            <a:r>
+              <a:rPr lang="en-US" dirty="0" err="1" smtClean="0">
+                <a:solidFill>
+                  <a:schemeClr val="bg1"/>
+                </a:solidFill>
+              </a:rPr>
+              <a:t>JQuery</a:t>
+            </a:r>
+            <a:endParaRPr lang="en-US" dirty="0" smtClean="0">
+              <a:solidFill>
+                <a:schemeClr val="bg1"/>
+              </a:solidFill>
+            </a:endParaRPr>
+          </a:p>
+          <a:p>
+            <a:r>
+              <a:rPr lang="en-US" dirty="0" err="1" smtClean="0">
+                <a:solidFill>
+                  <a:schemeClr val="bg1"/>
+                </a:solidFill>
+              </a:rPr>
+              <a:t>QUnit</a:t>
+            </a:r>
+            <a:endParaRPr lang="en-US" dirty="0" smtClean="0">
+              <a:solidFill>
+                <a:schemeClr val="bg1"/>
+              </a:solidFill>
+            </a:endParaRPr>
+          </a:p>
+          <a:p>
+            <a:r>
+              <a:rPr lang="en-US" dirty="0" err="1" smtClean="0">
+                <a:solidFill>
+                  <a:schemeClr val="bg1"/>
+                </a:solidFill>
+              </a:rPr>
+              <a:t>JUnit</a:t>
+            </a:r>
+            <a:endParaRPr lang="en-US" dirty="0" smtClean="0">
+              <a:solidFill>
+                <a:schemeClr val="bg1"/>
+              </a:solidFill>
+            </a:endParaRPr>
+          </a:p>
+          <a:p>
+            <a:r>
+              <a:rPr lang="en-US" dirty="0" smtClean="0">
+                <a:solidFill>
+                  <a:schemeClr val="bg1"/>
+                </a:solidFill>
+              </a:rPr>
+              <a:t>SBML Solvers</a:t>
+            </a:r>
+          </a:p>
+          <a:p>
+            <a:r>
+              <a:rPr lang="en-US" smtClean="0">
+                <a:solidFill>
+                  <a:schemeClr val="bg1"/>
+                </a:solidFill>
+              </a:rPr>
+              <a:t>Bootstrap </a:t>
+            </a:r>
+            <a:endParaRPr lang="en-US" dirty="0">
+              <a:solidFill>
+                <a:schemeClr val="bg1"/>
+              </a:solidFill>
+            </a:endParaRPr>
+          </a:p>
+        </p:txBody>
+      </p:sp>
+    </p:spTree>
+    <p:extLst>
+      <p:ext uri="{BB962C8B-B14F-4D97-AF65-F5344CB8AC3E}">
+        <p14:creationId xmlns:p14="http://schemas.microsoft.com/office/powerpoint/2010/main" val="1537970249"/>
+      </p:ext>
+    </p:extLst>
+  </p:cSld>
+  <p:clrMapOvr>
+    <a:masterClrMapping/>
+  </p:clrMapOvr>
+</p:sld>
+</file>
+
 <file path=ppt/slides/slide2.xml><?xml version="1.0" encoding="utf-8"?>
 <p:sld xmlns:a="http://schemas.openxmlformats.org/drawingml/2006/main" xmlns:r="http://schemas.openxmlformats.org/officeDocument/2006/relationships" xmlns:p="http://schemas.openxmlformats.org/presentationml/2006/main">
   <p:cSld>
@@ -4021,6 +4465,178 @@
       </p:par>
     </p:tnLst>
   </p:timing>
+</p:sld>
+</file>
+
+<file path=ppt/slides/slide8.xml><?xml version="1.0" encoding="utf-8"?>
+<p:sld xmlns:a="http://schemas.openxmlformats.org/drawingml/2006/main" xmlns:r="http://schemas.openxmlformats.org/officeDocument/2006/relationships" xmlns:p="http://schemas.openxmlformats.org/presentationml/2006/main">
+  <p:cSld>
+    <p:spTree>
+      <p:nvGrpSpPr>
+        <p:cNvPr id="1" name=""/>
+        <p:cNvGrpSpPr/>
+        <p:nvPr/>
+      </p:nvGrpSpPr>
+      <p:grpSpPr>
+        <a:xfrm>
+          <a:off x="0" y="0"/>
+          <a:ext cx="0" cy="0"/>
+          <a:chOff x="0" y="0"/>
+          <a:chExt cx="0" cy="0"/>
+        </a:xfrm>
+      </p:grpSpPr>
+      <p:sp>
+        <p:nvSpPr>
+          <p:cNvPr id="2" name="Title 1"/>
+          <p:cNvSpPr>
+            <a:spLocks noGrp="1"/>
+          </p:cNvSpPr>
+          <p:nvPr>
+            <p:ph type="title"/>
+          </p:nvPr>
+        </p:nvSpPr>
+        <p:spPr/>
+        <p:txBody>
+          <a:bodyPr/>
+          <a:lstStyle/>
+          <a:p>
+            <a:endParaRPr lang="en-US"/>
+          </a:p>
+        </p:txBody>
+      </p:sp>
+      <p:sp>
+        <p:nvSpPr>
+          <p:cNvPr id="3" name="Content Placeholder 2"/>
+          <p:cNvSpPr>
+            <a:spLocks noGrp="1"/>
+          </p:cNvSpPr>
+          <p:nvPr>
+            <p:ph idx="1"/>
+          </p:nvPr>
+        </p:nvSpPr>
+        <p:spPr/>
+        <p:txBody>
+          <a:bodyPr/>
+          <a:lstStyle/>
+          <a:p>
+            <a:endParaRPr lang="en-US"/>
+          </a:p>
+        </p:txBody>
+      </p:sp>
+    </p:spTree>
+    <p:extLst>
+      <p:ext uri="{BB962C8B-B14F-4D97-AF65-F5344CB8AC3E}">
+        <p14:creationId xmlns:p14="http://schemas.microsoft.com/office/powerpoint/2010/main" val="1868226890"/>
+      </p:ext>
+    </p:extLst>
+  </p:cSld>
+  <p:clrMapOvr>
+    <a:masterClrMapping/>
+  </p:clrMapOvr>
+</p:sld>
+</file>
+
+<file path=ppt/slides/slide9.xml><?xml version="1.0" encoding="utf-8"?>
+<p:sld xmlns:a="http://schemas.openxmlformats.org/drawingml/2006/main" xmlns:r="http://schemas.openxmlformats.org/officeDocument/2006/relationships" xmlns:p="http://schemas.openxmlformats.org/presentationml/2006/main">
+  <p:cSld>
+    <p:spTree>
+      <p:nvGrpSpPr>
+        <p:cNvPr id="1" name=""/>
+        <p:cNvGrpSpPr/>
+        <p:nvPr/>
+      </p:nvGrpSpPr>
+      <p:grpSpPr>
+        <a:xfrm>
+          <a:off x="0" y="0"/>
+          <a:ext cx="0" cy="0"/>
+          <a:chOff x="0" y="0"/>
+          <a:chExt cx="0" cy="0"/>
+        </a:xfrm>
+      </p:grpSpPr>
+      <p:sp>
+        <p:nvSpPr>
+          <p:cNvPr id="2" name="Title 1"/>
+          <p:cNvSpPr>
+            <a:spLocks noGrp="1"/>
+          </p:cNvSpPr>
+          <p:nvPr>
+            <p:ph type="title"/>
+          </p:nvPr>
+        </p:nvSpPr>
+        <p:spPr/>
+        <p:txBody>
+          <a:bodyPr>
+            <a:normAutofit/>
+          </a:bodyPr>
+          <a:lstStyle/>
+          <a:p>
+            <a:r>
+              <a:rPr lang="en-US" dirty="0" smtClean="0">
+                <a:solidFill>
+                  <a:schemeClr val="bg1"/>
+                </a:solidFill>
+              </a:rPr>
+              <a:t>Test coverage Java models</a:t>
+            </a:r>
+            <a:endParaRPr lang="en-US" dirty="0">
+              <a:solidFill>
+                <a:schemeClr val="bg1"/>
+              </a:solidFill>
+            </a:endParaRPr>
+          </a:p>
+        </p:txBody>
+      </p:sp>
+      <p:pic>
+        <p:nvPicPr>
+          <p:cNvPr id="1026" name="Picture 2" descr="D:\ContextProject\GIT\synthbio\deliverables\final-report\pictures\java-coverage-models.png"/>
+          <p:cNvPicPr>
+            <a:picLocks noChangeAspect="1" noChangeArrowheads="1"/>
+          </p:cNvPicPr>
+          <p:nvPr/>
+        </p:nvPicPr>
+        <p:blipFill>
+          <a:blip r:embed="rId2">
+            <a:extLst>
+              <a:ext uri="{28A0092B-C50C-407E-A947-70E740481C1C}">
+                <a14:useLocalDpi xmlns:a14="http://schemas.microsoft.com/office/drawing/2010/main" val="0"/>
+              </a:ext>
+            </a:extLst>
+          </a:blip>
+          <a:srcRect/>
+          <a:stretch>
+            <a:fillRect/>
+          </a:stretch>
+        </p:blipFill>
+        <p:spPr bwMode="auto">
+          <a:xfrm>
+            <a:off x="457200" y="1905000"/>
+            <a:ext cx="8229600" cy="3783447"/>
+          </a:xfrm>
+          <a:prstGeom prst="rect">
+            <a:avLst/>
+          </a:prstGeom>
+          <a:noFill/>
+          <a:extLst>
+            <a:ext uri="{909E8E84-426E-40DD-AFC4-6F175D3DCCD1}">
+              <a14:hiddenFill xmlns:a14="http://schemas.microsoft.com/office/drawing/2010/main">
+                <a:solidFill>
+                  <a:srgbClr val="FFFFFF"/>
+                </a:solidFill>
+              </a14:hiddenFill>
+            </a:ext>
+          </a:extLst>
+        </p:spPr>
+      </p:pic>
+    </p:spTree>
+    <p:extLst>
+      <p:ext uri="{BB962C8B-B14F-4D97-AF65-F5344CB8AC3E}">
+        <p14:creationId xmlns:p14="http://schemas.microsoft.com/office/powerpoint/2010/main" val="2777666372"/>
+      </p:ext>
+    </p:extLst>
+  </p:cSld>
+  <p:clrMapOvr>
+    <a:masterClrMapping/>
+  </p:clrMapOvr>
 </p:sld>
 </file>
 

</xml_diff>

<commit_message>
New proteins, and circuit of the teachers.
</commit_message>
<xml_diff>
--- a/Presentation/Zelula.pptx
+++ b/Presentation/Zelula.pptx
@@ -10,13 +10,12 @@
     <p:sldId id="258" r:id="rId4"/>
     <p:sldId id="259" r:id="rId5"/>
     <p:sldId id="260" r:id="rId6"/>
-    <p:sldId id="261" r:id="rId7"/>
-    <p:sldId id="262" r:id="rId8"/>
-    <p:sldId id="263" r:id="rId9"/>
-    <p:sldId id="264" r:id="rId10"/>
-    <p:sldId id="265" r:id="rId11"/>
-    <p:sldId id="266" r:id="rId12"/>
-    <p:sldId id="267" r:id="rId13"/>
+    <p:sldId id="262" r:id="rId7"/>
+    <p:sldId id="263" r:id="rId8"/>
+    <p:sldId id="264" r:id="rId9"/>
+    <p:sldId id="265" r:id="rId10"/>
+    <p:sldId id="266" r:id="rId11"/>
+    <p:sldId id="267" r:id="rId12"/>
   </p:sldIdLst>
   <p:sldSz cx="9144000" cy="6858000" type="screen4x3"/>
   <p:notesSz cx="6858000" cy="9144000"/>
@@ -299,7 +298,7 @@
           <a:p>
             <a:fld id="{0C47BD87-53EC-4C8C-BD55-C9A23E03CE8F}" type="datetimeFigureOut">
               <a:rPr lang="en-US" smtClean="0"/>
-              <a:t>20-6-2012</a:t>
+              <a:t>6/20/2012</a:t>
             </a:fld>
             <a:endParaRPr lang="en-US"/>
           </a:p>
@@ -469,7 +468,7 @@
           <a:p>
             <a:fld id="{0C47BD87-53EC-4C8C-BD55-C9A23E03CE8F}" type="datetimeFigureOut">
               <a:rPr lang="en-US" smtClean="0"/>
-              <a:t>20-6-2012</a:t>
+              <a:t>6/20/2012</a:t>
             </a:fld>
             <a:endParaRPr lang="en-US"/>
           </a:p>
@@ -649,7 +648,7 @@
           <a:p>
             <a:fld id="{0C47BD87-53EC-4C8C-BD55-C9A23E03CE8F}" type="datetimeFigureOut">
               <a:rPr lang="en-US" smtClean="0"/>
-              <a:t>20-6-2012</a:t>
+              <a:t>6/20/2012</a:t>
             </a:fld>
             <a:endParaRPr lang="en-US"/>
           </a:p>
@@ -819,7 +818,7 @@
           <a:p>
             <a:fld id="{0C47BD87-53EC-4C8C-BD55-C9A23E03CE8F}" type="datetimeFigureOut">
               <a:rPr lang="en-US" smtClean="0"/>
-              <a:t>20-6-2012</a:t>
+              <a:t>6/20/2012</a:t>
             </a:fld>
             <a:endParaRPr lang="en-US"/>
           </a:p>
@@ -1065,7 +1064,7 @@
           <a:p>
             <a:fld id="{0C47BD87-53EC-4C8C-BD55-C9A23E03CE8F}" type="datetimeFigureOut">
               <a:rPr lang="en-US" smtClean="0"/>
-              <a:t>20-6-2012</a:t>
+              <a:t>6/20/2012</a:t>
             </a:fld>
             <a:endParaRPr lang="en-US"/>
           </a:p>
@@ -1353,7 +1352,7 @@
           <a:p>
             <a:fld id="{0C47BD87-53EC-4C8C-BD55-C9A23E03CE8F}" type="datetimeFigureOut">
               <a:rPr lang="en-US" smtClean="0"/>
-              <a:t>20-6-2012</a:t>
+              <a:t>6/20/2012</a:t>
             </a:fld>
             <a:endParaRPr lang="en-US"/>
           </a:p>
@@ -1775,7 +1774,7 @@
           <a:p>
             <a:fld id="{0C47BD87-53EC-4C8C-BD55-C9A23E03CE8F}" type="datetimeFigureOut">
               <a:rPr lang="en-US" smtClean="0"/>
-              <a:t>20-6-2012</a:t>
+              <a:t>6/20/2012</a:t>
             </a:fld>
             <a:endParaRPr lang="en-US"/>
           </a:p>
@@ -1893,7 +1892,7 @@
           <a:p>
             <a:fld id="{0C47BD87-53EC-4C8C-BD55-C9A23E03CE8F}" type="datetimeFigureOut">
               <a:rPr lang="en-US" smtClean="0"/>
-              <a:t>20-6-2012</a:t>
+              <a:t>6/20/2012</a:t>
             </a:fld>
             <a:endParaRPr lang="en-US"/>
           </a:p>
@@ -1988,7 +1987,7 @@
           <a:p>
             <a:fld id="{0C47BD87-53EC-4C8C-BD55-C9A23E03CE8F}" type="datetimeFigureOut">
               <a:rPr lang="en-US" smtClean="0"/>
-              <a:t>20-6-2012</a:t>
+              <a:t>6/20/2012</a:t>
             </a:fld>
             <a:endParaRPr lang="en-US"/>
           </a:p>
@@ -2265,7 +2264,7 @@
           <a:p>
             <a:fld id="{0C47BD87-53EC-4C8C-BD55-C9A23E03CE8F}" type="datetimeFigureOut">
               <a:rPr lang="en-US" smtClean="0"/>
-              <a:t>20-6-2012</a:t>
+              <a:t>6/20/2012</a:t>
             </a:fld>
             <a:endParaRPr lang="en-US"/>
           </a:p>
@@ -2518,7 +2517,7 @@
           <a:p>
             <a:fld id="{0C47BD87-53EC-4C8C-BD55-C9A23E03CE8F}" type="datetimeFigureOut">
               <a:rPr lang="en-US" smtClean="0"/>
-              <a:t>20-6-2012</a:t>
+              <a:t>6/20/2012</a:t>
             </a:fld>
             <a:endParaRPr lang="en-US"/>
           </a:p>
@@ -2740,7 +2739,7 @@
           <a:p>
             <a:fld id="{0C47BD87-53EC-4C8C-BD55-C9A23E03CE8F}" type="datetimeFigureOut">
               <a:rPr lang="en-US" smtClean="0"/>
-              <a:t>20-6-2012</a:t>
+              <a:t>6/20/2012</a:t>
             </a:fld>
             <a:endParaRPr lang="en-US"/>
           </a:p>
@@ -3357,96 +3356,6 @@
                   <a:schemeClr val="bg1"/>
                 </a:solidFill>
               </a:rPr>
-              <a:t>Test coverage Java packages</a:t>
-            </a:r>
-            <a:endParaRPr lang="en-US" dirty="0">
-              <a:solidFill>
-                <a:schemeClr val="bg1"/>
-              </a:solidFill>
-            </a:endParaRPr>
-          </a:p>
-        </p:txBody>
-      </p:sp>
-      <p:pic>
-        <p:nvPicPr>
-          <p:cNvPr id="4" name="Content Placeholder 3"/>
-          <p:cNvPicPr>
-            <a:picLocks noGrp="1" noChangeAspect="1"/>
-          </p:cNvPicPr>
-          <p:nvPr>
-            <p:ph idx="1"/>
-          </p:nvPr>
-        </p:nvPicPr>
-        <p:blipFill>
-          <a:blip r:embed="rId2">
-            <a:extLst>
-              <a:ext uri="{28A0092B-C50C-407E-A947-70E740481C1C}">
-                <a14:useLocalDpi xmlns:a14="http://schemas.microsoft.com/office/drawing/2010/main" val="0"/>
-              </a:ext>
-            </a:extLst>
-          </a:blip>
-          <a:stretch>
-            <a:fillRect/>
-          </a:stretch>
-        </p:blipFill>
-        <p:spPr>
-          <a:xfrm>
-            <a:off x="457200" y="2796828"/>
-            <a:ext cx="8229600" cy="2132707"/>
-          </a:xfrm>
-        </p:spPr>
-      </p:pic>
-    </p:spTree>
-    <p:extLst>
-      <p:ext uri="{BB962C8B-B14F-4D97-AF65-F5344CB8AC3E}">
-        <p14:creationId xmlns:p14="http://schemas.microsoft.com/office/powerpoint/2010/main" val="2020631500"/>
-      </p:ext>
-    </p:extLst>
-  </p:cSld>
-  <p:clrMapOvr>
-    <a:masterClrMapping/>
-  </p:clrMapOvr>
-</p:sld>
-</file>
-
-<file path=ppt/slides/slide11.xml><?xml version="1.0" encoding="utf-8"?>
-<p:sld xmlns:a="http://schemas.openxmlformats.org/drawingml/2006/main" xmlns:r="http://schemas.openxmlformats.org/officeDocument/2006/relationships" xmlns:p="http://schemas.openxmlformats.org/presentationml/2006/main">
-  <p:cSld>
-    <p:spTree>
-      <p:nvGrpSpPr>
-        <p:cNvPr id="1" name=""/>
-        <p:cNvGrpSpPr/>
-        <p:nvPr/>
-      </p:nvGrpSpPr>
-      <p:grpSpPr>
-        <a:xfrm>
-          <a:off x="0" y="0"/>
-          <a:ext cx="0" cy="0"/>
-          <a:chOff x="0" y="0"/>
-          <a:chExt cx="0" cy="0"/>
-        </a:xfrm>
-      </p:grpSpPr>
-      <p:sp>
-        <p:nvSpPr>
-          <p:cNvPr id="2" name="Title 1"/>
-          <p:cNvSpPr>
-            <a:spLocks noGrp="1"/>
-          </p:cNvSpPr>
-          <p:nvPr>
-            <p:ph type="title"/>
-          </p:nvPr>
-        </p:nvSpPr>
-        <p:spPr/>
-        <p:txBody>
-          <a:bodyPr/>
-          <a:lstStyle/>
-          <a:p>
-            <a:r>
-              <a:rPr lang="en-US" dirty="0" smtClean="0">
-                <a:solidFill>
-                  <a:schemeClr val="bg1"/>
-                </a:solidFill>
-              </a:rPr>
               <a:t>Future implementation part 2</a:t>
             </a:r>
             <a:endParaRPr lang="en-US" dirty="0">
@@ -3551,7 +3460,7 @@
 </p:sld>
 </file>
 
-<file path=ppt/slides/slide12.xml><?xml version="1.0" encoding="utf-8"?>
+<file path=ppt/slides/slide11.xml><?xml version="1.0" encoding="utf-8"?>
 <p:sld xmlns:a="http://schemas.openxmlformats.org/drawingml/2006/main" xmlns:r="http://schemas.openxmlformats.org/officeDocument/2006/relationships" xmlns:p="http://schemas.openxmlformats.org/presentationml/2006/main">
   <p:cSld>
     <p:spTree>
@@ -3857,18 +3766,13 @@
                   <a:schemeClr val="bg1"/>
                 </a:solidFill>
               </a:rPr>
-              <a:t>Future implementation</a:t>
-            </a:r>
-          </a:p>
-          <a:p>
-            <a:r>
-              <a:rPr lang="en-US" dirty="0" smtClean="0">
-                <a:solidFill>
-                  <a:schemeClr val="bg1"/>
-                </a:solidFill>
-              </a:rPr>
               <a:t>Demo</a:t>
             </a:r>
+            <a:endParaRPr lang="en-US" dirty="0" smtClean="0">
+              <a:solidFill>
+                <a:schemeClr val="bg1"/>
+              </a:solidFill>
+            </a:endParaRPr>
           </a:p>
           <a:p>
             <a:endParaRPr lang="en-US" dirty="0"/>
@@ -4277,7 +4181,7 @@
                   <a:schemeClr val="bg1"/>
                 </a:solidFill>
               </a:rPr>
-              <a:t>Future implementation</a:t>
+              <a:t>Demo</a:t>
             </a:r>
             <a:endParaRPr lang="en-US" dirty="0">
               <a:solidFill>
@@ -4287,103 +4191,10 @@
           </a:p>
         </p:txBody>
       </p:sp>
-      <p:sp>
-        <p:nvSpPr>
-          <p:cNvPr id="3" name="Content Placeholder 2"/>
-          <p:cNvSpPr>
-            <a:spLocks noGrp="1"/>
-          </p:cNvSpPr>
-          <p:nvPr>
-            <p:ph idx="1"/>
-          </p:nvPr>
-        </p:nvSpPr>
-        <p:spPr>
-          <a:xfrm>
-            <a:off x="457200" y="1676400"/>
-            <a:ext cx="8229600" cy="4525963"/>
-          </a:xfrm>
-        </p:spPr>
-        <p:txBody>
-          <a:bodyPr/>
-          <a:lstStyle/>
-          <a:p>
-            <a:r>
-              <a:rPr lang="en-US" dirty="0" smtClean="0">
-                <a:solidFill>
-                  <a:schemeClr val="bg1"/>
-                </a:solidFill>
-              </a:rPr>
-              <a:t>Displaying compound gates different</a:t>
-            </a:r>
-          </a:p>
-          <a:p>
-            <a:endParaRPr lang="en-US" dirty="0" smtClean="0">
-              <a:solidFill>
-                <a:schemeClr val="bg1"/>
-              </a:solidFill>
-            </a:endParaRPr>
-          </a:p>
-          <a:p>
-            <a:r>
-              <a:rPr lang="en-US" dirty="0" smtClean="0">
-                <a:solidFill>
-                  <a:schemeClr val="bg1"/>
-                </a:solidFill>
-              </a:rPr>
-              <a:t>Advanced zooming</a:t>
-            </a:r>
-          </a:p>
-          <a:p>
-            <a:endParaRPr lang="en-US" dirty="0" smtClean="0">
-              <a:solidFill>
-                <a:schemeClr val="bg1"/>
-              </a:solidFill>
-            </a:endParaRPr>
-          </a:p>
-          <a:p>
-            <a:r>
-              <a:rPr lang="en-US" dirty="0" smtClean="0">
-                <a:solidFill>
-                  <a:schemeClr val="bg1"/>
-                </a:solidFill>
-              </a:rPr>
-              <a:t>Simulation </a:t>
-            </a:r>
-            <a:r>
-              <a:rPr lang="en-US" dirty="0">
-                <a:solidFill>
-                  <a:schemeClr val="bg1"/>
-                </a:solidFill>
-              </a:rPr>
-              <a:t>results in separate </a:t>
-            </a:r>
-            <a:r>
-              <a:rPr lang="en-US" dirty="0" smtClean="0">
-                <a:solidFill>
-                  <a:schemeClr val="bg1"/>
-                </a:solidFill>
-              </a:rPr>
-              <a:t>screen</a:t>
-            </a:r>
-            <a:endParaRPr lang="en-US" dirty="0">
-              <a:solidFill>
-                <a:schemeClr val="bg1"/>
-              </a:solidFill>
-            </a:endParaRPr>
-          </a:p>
-          <a:p>
-            <a:endParaRPr lang="en-US" dirty="0">
-              <a:solidFill>
-                <a:schemeClr val="bg1"/>
-              </a:solidFill>
-            </a:endParaRPr>
-          </a:p>
-        </p:txBody>
-      </p:sp>
     </p:spTree>
     <p:extLst>
       <p:ext uri="{BB962C8B-B14F-4D97-AF65-F5344CB8AC3E}">
-        <p14:creationId xmlns:p14="http://schemas.microsoft.com/office/powerpoint/2010/main" val="548740944"/>
+        <p14:creationId xmlns:p14="http://schemas.microsoft.com/office/powerpoint/2010/main" val="3041110859"/>
       </p:ext>
     </p:extLst>
   </p:cSld>
@@ -4432,74 +4243,6 @@
           <a:bodyPr/>
           <a:lstStyle/>
           <a:p>
-            <a:r>
-              <a:rPr lang="en-US" dirty="0" smtClean="0">
-                <a:solidFill>
-                  <a:schemeClr val="bg1"/>
-                </a:solidFill>
-              </a:rPr>
-              <a:t>Demo</a:t>
-            </a:r>
-            <a:endParaRPr lang="en-US" dirty="0">
-              <a:solidFill>
-                <a:schemeClr val="bg1"/>
-              </a:solidFill>
-            </a:endParaRPr>
-          </a:p>
-        </p:txBody>
-      </p:sp>
-    </p:spTree>
-    <p:extLst>
-      <p:ext uri="{BB962C8B-B14F-4D97-AF65-F5344CB8AC3E}">
-        <p14:creationId xmlns:p14="http://schemas.microsoft.com/office/powerpoint/2010/main" val="3041110859"/>
-      </p:ext>
-    </p:extLst>
-  </p:cSld>
-  <p:clrMapOvr>
-    <a:masterClrMapping/>
-  </p:clrMapOvr>
-  <p:timing>
-    <p:tnLst>
-      <p:par>
-        <p:cTn id="1" dur="indefinite" restart="never" nodeType="tmRoot"/>
-      </p:par>
-    </p:tnLst>
-  </p:timing>
-</p:sld>
-</file>
-
-<file path=ppt/slides/slide8.xml><?xml version="1.0" encoding="utf-8"?>
-<p:sld xmlns:a="http://schemas.openxmlformats.org/drawingml/2006/main" xmlns:r="http://schemas.openxmlformats.org/officeDocument/2006/relationships" xmlns:p="http://schemas.openxmlformats.org/presentationml/2006/main">
-  <p:cSld>
-    <p:spTree>
-      <p:nvGrpSpPr>
-        <p:cNvPr id="1" name=""/>
-        <p:cNvGrpSpPr/>
-        <p:nvPr/>
-      </p:nvGrpSpPr>
-      <p:grpSpPr>
-        <a:xfrm>
-          <a:off x="0" y="0"/>
-          <a:ext cx="0" cy="0"/>
-          <a:chOff x="0" y="0"/>
-          <a:chExt cx="0" cy="0"/>
-        </a:xfrm>
-      </p:grpSpPr>
-      <p:sp>
-        <p:nvSpPr>
-          <p:cNvPr id="2" name="Title 1"/>
-          <p:cNvSpPr>
-            <a:spLocks noGrp="1"/>
-          </p:cNvSpPr>
-          <p:nvPr>
-            <p:ph type="title"/>
-          </p:nvPr>
-        </p:nvSpPr>
-        <p:spPr/>
-        <p:txBody>
-          <a:bodyPr/>
-          <a:lstStyle/>
-          <a:p>
             <a:endParaRPr lang="en-US"/>
           </a:p>
         </p:txBody>
@@ -4536,7 +4279,7 @@
 </p:sld>
 </file>
 
-<file path=ppt/slides/slide9.xml><?xml version="1.0" encoding="utf-8"?>
+<file path=ppt/slides/slide8.xml><?xml version="1.0" encoding="utf-8"?>
 <p:sld xmlns:a="http://schemas.openxmlformats.org/drawingml/2006/main" xmlns:r="http://schemas.openxmlformats.org/officeDocument/2006/relationships" xmlns:p="http://schemas.openxmlformats.org/presentationml/2006/main">
   <p:cSld>
     <p:spTree>
@@ -4631,6 +4374,96 @@
     <p:extLst>
       <p:ext uri="{BB962C8B-B14F-4D97-AF65-F5344CB8AC3E}">
         <p14:creationId xmlns:p14="http://schemas.microsoft.com/office/powerpoint/2010/main" val="2777666372"/>
+      </p:ext>
+    </p:extLst>
+  </p:cSld>
+  <p:clrMapOvr>
+    <a:masterClrMapping/>
+  </p:clrMapOvr>
+</p:sld>
+</file>
+
+<file path=ppt/slides/slide9.xml><?xml version="1.0" encoding="utf-8"?>
+<p:sld xmlns:a="http://schemas.openxmlformats.org/drawingml/2006/main" xmlns:r="http://schemas.openxmlformats.org/officeDocument/2006/relationships" xmlns:p="http://schemas.openxmlformats.org/presentationml/2006/main">
+  <p:cSld>
+    <p:spTree>
+      <p:nvGrpSpPr>
+        <p:cNvPr id="1" name=""/>
+        <p:cNvGrpSpPr/>
+        <p:nvPr/>
+      </p:nvGrpSpPr>
+      <p:grpSpPr>
+        <a:xfrm>
+          <a:off x="0" y="0"/>
+          <a:ext cx="0" cy="0"/>
+          <a:chOff x="0" y="0"/>
+          <a:chExt cx="0" cy="0"/>
+        </a:xfrm>
+      </p:grpSpPr>
+      <p:sp>
+        <p:nvSpPr>
+          <p:cNvPr id="2" name="Title 1"/>
+          <p:cNvSpPr>
+            <a:spLocks noGrp="1"/>
+          </p:cNvSpPr>
+          <p:nvPr>
+            <p:ph type="title"/>
+          </p:nvPr>
+        </p:nvSpPr>
+        <p:spPr/>
+        <p:txBody>
+          <a:bodyPr/>
+          <a:lstStyle/>
+          <a:p>
+            <a:r>
+              <a:rPr lang="en-US" dirty="0" smtClean="0">
+                <a:solidFill>
+                  <a:schemeClr val="bg1"/>
+                </a:solidFill>
+              </a:rPr>
+              <a:t>Test coverage Java packages</a:t>
+            </a:r>
+            <a:endParaRPr lang="en-US" dirty="0">
+              <a:solidFill>
+                <a:schemeClr val="bg1"/>
+              </a:solidFill>
+            </a:endParaRPr>
+          </a:p>
+        </p:txBody>
+      </p:sp>
+      <p:pic>
+        <p:nvPicPr>
+          <p:cNvPr id="4" name="Content Placeholder 3"/>
+          <p:cNvPicPr>
+            <a:picLocks noGrp="1" noChangeAspect="1"/>
+          </p:cNvPicPr>
+          <p:nvPr>
+            <p:ph idx="1"/>
+          </p:nvPr>
+        </p:nvPicPr>
+        <p:blipFill>
+          <a:blip r:embed="rId2">
+            <a:extLst>
+              <a:ext uri="{28A0092B-C50C-407E-A947-70E740481C1C}">
+                <a14:useLocalDpi xmlns:a14="http://schemas.microsoft.com/office/drawing/2010/main" val="0"/>
+              </a:ext>
+            </a:extLst>
+          </a:blip>
+          <a:stretch>
+            <a:fillRect/>
+          </a:stretch>
+        </p:blipFill>
+        <p:spPr>
+          <a:xfrm>
+            <a:off x="457200" y="2796828"/>
+            <a:ext cx="8229600" cy="2132707"/>
+          </a:xfrm>
+        </p:spPr>
+      </p:pic>
+    </p:spTree>
+    <p:extLst>
+      <p:ext uri="{BB962C8B-B14F-4D97-AF65-F5344CB8AC3E}">
+        <p14:creationId xmlns:p14="http://schemas.microsoft.com/office/powerpoint/2010/main" val="2020631500"/>
       </p:ext>
     </p:extLst>
   </p:cSld>

</xml_diff>